<commit_message>
Updated PlanOnAPage for GW3
Updated the date from the GW2 date
</commit_message>
<xml_diff>
--- a/PlanOnAPage GW3 - Team EARTH.pptx
+++ b/PlanOnAPage GW3 - Team EARTH.pptx
@@ -3698,7 +3698,7 @@
           <a:p>
             <a:fld id="{B0336C00-8D0F-1D46-AC77-763F480FC148}" type="datetimeFigureOut">
               <a:rPr lang="en-US" smtClean="0"/>
-              <a:t>3/13/2020</a:t>
+              <a:t>3/18/2020</a:t>
             </a:fld>
             <a:endParaRPr lang="en-US" dirty="0"/>
           </a:p>
@@ -4285,7 +4285,7 @@
             <a:fld id="{E2098E45-8613-C448-9E1A-94EC1524DA2C}" type="datetimeFigureOut">
               <a:rPr lang="en-GB" altLang="en-US"/>
               <a:pPr/>
-              <a:t>13/03/2020</a:t>
+              <a:t>18/03/2020</a:t>
             </a:fld>
             <a:endParaRPr lang="en-GB" altLang="en-US" dirty="0"/>
           </a:p>
@@ -4500,7 +4500,7 @@
             <a:fld id="{E80A0F75-BCCC-DA41-AAE2-B7061CF7B4B1}" type="datetimeFigureOut">
               <a:rPr lang="en-GB" altLang="en-US"/>
               <a:pPr/>
-              <a:t>13/03/2020</a:t>
+              <a:t>18/03/2020</a:t>
             </a:fld>
             <a:endParaRPr lang="en-GB" altLang="en-US" dirty="0"/>
           </a:p>
@@ -4783,7 +4783,7 @@
             <a:fld id="{BBAC0CC7-17C0-5246-9D9C-199D1928C7ED}" type="datetimeFigureOut">
               <a:rPr lang="en-GB" altLang="en-US"/>
               <a:pPr/>
-              <a:t>13/03/2020</a:t>
+              <a:t>18/03/2020</a:t>
             </a:fld>
             <a:endParaRPr lang="en-GB" altLang="en-US" dirty="0"/>
           </a:p>
@@ -5111,7 +5111,7 @@
             <a:fld id="{0F652A3C-3E6D-5245-AE3D-038F994A070F}" type="datetimeFigureOut">
               <a:rPr lang="en-GB" altLang="en-US"/>
               <a:pPr/>
-              <a:t>13/03/2020</a:t>
+              <a:t>18/03/2020</a:t>
             </a:fld>
             <a:endParaRPr lang="en-GB" altLang="en-US" dirty="0"/>
           </a:p>
@@ -5411,7 +5411,7 @@
             <a:fld id="{99B714EF-1B8F-7843-9384-B6CACED58BB8}" type="datetimeFigureOut">
               <a:rPr lang="en-GB" altLang="en-US"/>
               <a:pPr/>
-              <a:t>13/03/2020</a:t>
+              <a:t>18/03/2020</a:t>
             </a:fld>
             <a:endParaRPr lang="en-GB" altLang="en-US" dirty="0"/>
           </a:p>
@@ -5541,7 +5541,7 @@
             <a:fld id="{0ABFB3EE-3F72-9A45-8B23-B03DB6D51EFF}" type="datetimeFigureOut">
               <a:rPr lang="en-GB" altLang="en-US"/>
               <a:pPr/>
-              <a:t>13/03/2020</a:t>
+              <a:t>18/03/2020</a:t>
             </a:fld>
             <a:endParaRPr lang="en-GB" altLang="en-US" dirty="0"/>
           </a:p>
@@ -5836,7 +5836,7 @@
             <a:fld id="{DE3B8E72-D842-5F4F-8456-57799CFE5BF0}" type="datetimeFigureOut">
               <a:rPr lang="en-GB" altLang="en-US"/>
               <a:pPr/>
-              <a:t>13/03/2020</a:t>
+              <a:t>18/03/2020</a:t>
             </a:fld>
             <a:endParaRPr lang="en-GB" altLang="en-US" dirty="0"/>
           </a:p>
@@ -6152,7 +6152,7 @@
             <a:fld id="{BAFDC76B-2780-2747-8F70-38AF00AD5A4E}" type="datetimeFigureOut">
               <a:rPr lang="en-GB" altLang="en-US"/>
               <a:pPr/>
-              <a:t>13/03/2020</a:t>
+              <a:t>18/03/2020</a:t>
             </a:fld>
             <a:endParaRPr lang="en-GB" altLang="en-US" dirty="0"/>
           </a:p>
@@ -6772,7 +6772,7 @@
           <a:p>
             <a:r>
               <a:rPr lang="en-US" dirty="0"/>
-              <a:t>09/01/2020</a:t>
+              <a:t>18/03/2020</a:t>
             </a:r>
             <a:endParaRPr lang="en-US" b="0" dirty="0"/>
           </a:p>
@@ -11134,21 +11134,6 @@
 </file>
 
 <file path=customXml/item1.xml><?xml version="1.0" encoding="utf-8"?>
-<p:properties xmlns:p="http://schemas.microsoft.com/office/2006/metadata/properties" xmlns:xsi="http://www.w3.org/2001/XMLSchema-instance" xmlns:pc="http://schemas.microsoft.com/office/infopath/2007/PartnerControls">
-  <documentManagement/>
-</p:properties>
-</file>
-
-<file path=customXml/item2.xml><?xml version="1.0" encoding="utf-8"?>
-<?mso-contentType ?>
-<FormTemplates xmlns="http://schemas.microsoft.com/sharepoint/v3/contenttype/forms">
-  <Display>DocumentLibraryForm</Display>
-  <Edit>DocumentLibraryForm</Edit>
-  <New>DocumentLibraryForm</New>
-</FormTemplates>
-</file>
-
-<file path=customXml/item3.xml><?xml version="1.0" encoding="utf-8"?>
 <ct:contentTypeSchema xmlns:ct="http://schemas.microsoft.com/office/2006/metadata/contentType" xmlns:ma="http://schemas.microsoft.com/office/2006/metadata/properties/metaAttributes" ct:_="" ma:_="" ma:contentTypeName="Document" ma:contentTypeID="0x010100E8F7C4DB326074459C3458FF10DB7C91" ma:contentTypeVersion="2" ma:contentTypeDescription="Create a new document." ma:contentTypeScope="" ma:versionID="daa978b1192ad3f28f1b3e8c26b32491">
   <xsd:schema xmlns:xsd="http://www.w3.org/2001/XMLSchema" xmlns:xs="http://www.w3.org/2001/XMLSchema" xmlns:p="http://schemas.microsoft.com/office/2006/metadata/properties" xmlns:ns2="6f034438-ba91-4733-a050-7ec27334b0a3" targetNamespace="http://schemas.microsoft.com/office/2006/metadata/properties" ma:root="true" ma:fieldsID="3a0806cea3c95fbc0b4670c08a1eb2be" ns2:_="">
     <xsd:import namespace="6f034438-ba91-4733-a050-7ec27334b0a3"/>
@@ -11280,31 +11265,22 @@
 </ct:contentTypeSchema>
 </file>
 
-<file path=customXml/itemProps1.xml><?xml version="1.0" encoding="utf-8"?>
-<ds:datastoreItem xmlns:ds="http://schemas.openxmlformats.org/officeDocument/2006/customXml" ds:itemID="{B71EEB7D-DE24-455D-B878-70BD3E87B7E7}">
-  <ds:schemaRefs>
-    <ds:schemaRef ds:uri="http://schemas.microsoft.com/office/2006/documentManagement/types"/>
-    <ds:schemaRef ds:uri="http://schemas.microsoft.com/office/2006/metadata/properties"/>
-    <ds:schemaRef ds:uri="http://purl.org/dc/terms/"/>
-    <ds:schemaRef ds:uri="http://schemas.openxmlformats.org/package/2006/metadata/core-properties"/>
-    <ds:schemaRef ds:uri="http://purl.org/dc/dcmitype/"/>
-    <ds:schemaRef ds:uri="http://schemas.microsoft.com/office/infopath/2007/PartnerControls"/>
-    <ds:schemaRef ds:uri="6f034438-ba91-4733-a050-7ec27334b0a3"/>
-    <ds:schemaRef ds:uri="http://www.w3.org/XML/1998/namespace"/>
-    <ds:schemaRef ds:uri="http://purl.org/dc/elements/1.1/"/>
-  </ds:schemaRefs>
-</ds:datastoreItem>
+<file path=customXml/item2.xml><?xml version="1.0" encoding="utf-8"?>
+<?mso-contentType ?>
+<FormTemplates xmlns="http://schemas.microsoft.com/sharepoint/v3/contenttype/forms">
+  <Display>DocumentLibraryForm</Display>
+  <Edit>DocumentLibraryForm</Edit>
+  <New>DocumentLibraryForm</New>
+</FormTemplates>
 </file>
 
-<file path=customXml/itemProps2.xml><?xml version="1.0" encoding="utf-8"?>
-<ds:datastoreItem xmlns:ds="http://schemas.openxmlformats.org/officeDocument/2006/customXml" ds:itemID="{2619E8A7-E69B-4AC6-8351-B503999EBC26}">
-  <ds:schemaRefs>
-    <ds:schemaRef ds:uri="http://schemas.microsoft.com/sharepoint/v3/contenttype/forms"/>
-  </ds:schemaRefs>
-</ds:datastoreItem>
+<file path=customXml/item3.xml><?xml version="1.0" encoding="utf-8"?>
+<p:properties xmlns:p="http://schemas.microsoft.com/office/2006/metadata/properties" xmlns:xsi="http://www.w3.org/2001/XMLSchema-instance" xmlns:pc="http://schemas.microsoft.com/office/infopath/2007/PartnerControls">
+  <documentManagement/>
+</p:properties>
 </file>
 
-<file path=customXml/itemProps3.xml><?xml version="1.0" encoding="utf-8"?>
+<file path=customXml/itemProps1.xml><?xml version="1.0" encoding="utf-8"?>
 <ds:datastoreItem xmlns:ds="http://schemas.openxmlformats.org/officeDocument/2006/customXml" ds:itemID="{72FA1786-0A86-42E0-9922-C34A8A624A27}">
   <ds:schemaRefs>
     <ds:schemaRef ds:uri="http://schemas.microsoft.com/office/2006/metadata/contentType"/>
@@ -11320,4 +11296,28 @@
     <ds:schemaRef ds:uri="http://schemas.microsoft.com/internal/obd"/>
   </ds:schemaRefs>
 </ds:datastoreItem>
+</file>
+
+<file path=customXml/itemProps2.xml><?xml version="1.0" encoding="utf-8"?>
+<ds:datastoreItem xmlns:ds="http://schemas.openxmlformats.org/officeDocument/2006/customXml" ds:itemID="{2619E8A7-E69B-4AC6-8351-B503999EBC26}">
+  <ds:schemaRefs>
+    <ds:schemaRef ds:uri="http://schemas.microsoft.com/sharepoint/v3/contenttype/forms"/>
+  </ds:schemaRefs>
+</ds:datastoreItem>
+</file>
+
+<file path=customXml/itemProps3.xml><?xml version="1.0" encoding="utf-8"?>
+<ds:datastoreItem xmlns:ds="http://schemas.openxmlformats.org/officeDocument/2006/customXml" ds:itemID="{B71EEB7D-DE24-455D-B878-70BD3E87B7E7}">
+  <ds:schemaRefs>
+    <ds:schemaRef ds:uri="http://schemas.microsoft.com/office/2006/documentManagement/types"/>
+    <ds:schemaRef ds:uri="http://schemas.microsoft.com/office/2006/metadata/properties"/>
+    <ds:schemaRef ds:uri="http://purl.org/dc/terms/"/>
+    <ds:schemaRef ds:uri="http://schemas.openxmlformats.org/package/2006/metadata/core-properties"/>
+    <ds:schemaRef ds:uri="http://purl.org/dc/dcmitype/"/>
+    <ds:schemaRef ds:uri="http://schemas.microsoft.com/office/infopath/2007/PartnerControls"/>
+    <ds:schemaRef ds:uri="6f034438-ba91-4733-a050-7ec27334b0a3"/>
+    <ds:schemaRef ds:uri="http://www.w3.org/XML/1998/namespace"/>
+    <ds:schemaRef ds:uri="http://purl.org/dc/elements/1.1/"/>
+  </ds:schemaRefs>
+</ds:datastoreItem>
 </file>
</xml_diff>